<commit_message>
Adding Chapter 3 and cleaning up repo
</commit_message>
<xml_diff>
--- a/Slides/Azure and Terraform Workshop - Chapter 2.pptx
+++ b/Slides/Azure and Terraform Workshop - Chapter 2.pptx
@@ -12,7 +12,7 @@
     <p:sldMasterId id="2147483720" r:id="rId8"/>
   </p:sldMasterIdLst>
   <p:notesMasterIdLst>
-    <p:notesMasterId r:id="rId75"/>
+    <p:notesMasterId r:id="rId65"/>
   </p:notesMasterIdLst>
   <p:sldIdLst>
     <p:sldId id="256" r:id="rId9"/>
@@ -71,16 +71,6 @@
     <p:sldId id="326" r:id="rId62"/>
     <p:sldId id="327" r:id="rId63"/>
     <p:sldId id="328" r:id="rId64"/>
-    <p:sldId id="306" r:id="rId65"/>
-    <p:sldId id="307" r:id="rId66"/>
-    <p:sldId id="308" r:id="rId67"/>
-    <p:sldId id="309" r:id="rId68"/>
-    <p:sldId id="295" r:id="rId69"/>
-    <p:sldId id="296" r:id="rId70"/>
-    <p:sldId id="300" r:id="rId71"/>
-    <p:sldId id="280" r:id="rId72"/>
-    <p:sldId id="284" r:id="rId73"/>
-    <p:sldId id="283" r:id="rId74"/>
   </p:sldIdLst>
   <p:sldSz cx="12192000" cy="6858000"/>
   <p:notesSz cx="6858000" cy="9144000"/>
@@ -269,7 +259,7 @@
           <a:p>
             <a:fld id="{9CC547AF-2D05-7346-8286-943F59EB94DF}" type="datetimeFigureOut">
               <a:rPr lang="en-US" smtClean="0"/>
-              <a:t>1/2/18</a:t>
+              <a:t>1/3/18</a:t>
             </a:fld>
             <a:endParaRPr lang="en-US"/>
           </a:p>
@@ -2495,244 +2485,6 @@
 </p:notes>
 </file>
 
-<file path=ppt/notesSlides/notesSlide32.xml><?xml version="1.0" encoding="utf-8"?>
-<p:notes xmlns:a="http://schemas.openxmlformats.org/drawingml/2006/main" xmlns:r="http://schemas.openxmlformats.org/officeDocument/2006/relationships" xmlns:p="http://schemas.openxmlformats.org/presentationml/2006/main">
-  <p:cSld>
-    <p:spTree>
-      <p:nvGrpSpPr>
-        <p:cNvPr id="1" name=""/>
-        <p:cNvGrpSpPr/>
-        <p:nvPr/>
-      </p:nvGrpSpPr>
-      <p:grpSpPr>
-        <a:xfrm>
-          <a:off x="0" y="0"/>
-          <a:ext cx="0" cy="0"/>
-          <a:chOff x="0" y="0"/>
-          <a:chExt cx="0" cy="0"/>
-        </a:xfrm>
-      </p:grpSpPr>
-      <p:sp>
-        <p:nvSpPr>
-          <p:cNvPr id="820" name="Shape 820"/>
-          <p:cNvSpPr>
-            <a:spLocks noGrp="1" noRot="1" noChangeAspect="1"/>
-          </p:cNvSpPr>
-          <p:nvPr>
-            <p:ph type="sldImg"/>
-          </p:nvPr>
-        </p:nvSpPr>
-        <p:spPr>
-          <a:xfrm>
-            <a:off x="381000" y="685800"/>
-            <a:ext cx="6096000" cy="3429000"/>
-          </a:xfrm>
-          <a:prstGeom prst="rect">
-            <a:avLst/>
-          </a:prstGeom>
-        </p:spPr>
-        <p:txBody>
-          <a:bodyPr/>
-          <a:lstStyle/>
-          <a:p>
-            <a:endParaRPr/>
-          </a:p>
-        </p:txBody>
-      </p:sp>
-      <p:sp>
-        <p:nvSpPr>
-          <p:cNvPr id="821" name="Shape 821"/>
-          <p:cNvSpPr>
-            <a:spLocks noGrp="1"/>
-          </p:cNvSpPr>
-          <p:nvPr>
-            <p:ph type="body" sz="quarter" idx="1"/>
-          </p:nvPr>
-        </p:nvSpPr>
-        <p:spPr>
-          <a:prstGeom prst="rect">
-            <a:avLst/>
-          </a:prstGeom>
-        </p:spPr>
-        <p:txBody>
-          <a:bodyPr/>
-          <a:lstStyle/>
-          <a:p>
-            <a:endParaRPr dirty="0"/>
-          </a:p>
-        </p:txBody>
-      </p:sp>
-    </p:spTree>
-    <p:extLst>
-      <p:ext uri="{BB962C8B-B14F-4D97-AF65-F5344CB8AC3E}">
-        <p14:creationId xmlns:p14="http://schemas.microsoft.com/office/powerpoint/2010/main" val="295715083"/>
-      </p:ext>
-    </p:extLst>
-  </p:cSld>
-  <p:clrMapOvr>
-    <a:masterClrMapping/>
-  </p:clrMapOvr>
-</p:notes>
-</file>
-
-<file path=ppt/notesSlides/notesSlide33.xml><?xml version="1.0" encoding="utf-8"?>
-<p:notes xmlns:a="http://schemas.openxmlformats.org/drawingml/2006/main" xmlns:r="http://schemas.openxmlformats.org/officeDocument/2006/relationships" xmlns:p="http://schemas.openxmlformats.org/presentationml/2006/main">
-  <p:cSld>
-    <p:spTree>
-      <p:nvGrpSpPr>
-        <p:cNvPr id="1" name=""/>
-        <p:cNvGrpSpPr/>
-        <p:nvPr/>
-      </p:nvGrpSpPr>
-      <p:grpSpPr>
-        <a:xfrm>
-          <a:off x="0" y="0"/>
-          <a:ext cx="0" cy="0"/>
-          <a:chOff x="0" y="0"/>
-          <a:chExt cx="0" cy="0"/>
-        </a:xfrm>
-      </p:grpSpPr>
-      <p:sp>
-        <p:nvSpPr>
-          <p:cNvPr id="1067" name="Shape 1067"/>
-          <p:cNvSpPr>
-            <a:spLocks noGrp="1" noRot="1" noChangeAspect="1"/>
-          </p:cNvSpPr>
-          <p:nvPr>
-            <p:ph type="sldImg"/>
-          </p:nvPr>
-        </p:nvSpPr>
-        <p:spPr>
-          <a:xfrm>
-            <a:off x="381000" y="685800"/>
-            <a:ext cx="6096000" cy="3429000"/>
-          </a:xfrm>
-          <a:prstGeom prst="rect">
-            <a:avLst/>
-          </a:prstGeom>
-        </p:spPr>
-        <p:txBody>
-          <a:bodyPr/>
-          <a:lstStyle/>
-          <a:p>
-            <a:endParaRPr/>
-          </a:p>
-        </p:txBody>
-      </p:sp>
-      <p:sp>
-        <p:nvSpPr>
-          <p:cNvPr id="1068" name="Shape 1068"/>
-          <p:cNvSpPr>
-            <a:spLocks noGrp="1"/>
-          </p:cNvSpPr>
-          <p:nvPr>
-            <p:ph type="body" sz="quarter" idx="1"/>
-          </p:nvPr>
-        </p:nvSpPr>
-        <p:spPr>
-          <a:prstGeom prst="rect">
-            <a:avLst/>
-          </a:prstGeom>
-        </p:spPr>
-        <p:txBody>
-          <a:bodyPr/>
-          <a:lstStyle/>
-          <a:p>
-            <a:r>
-              <a:t>Here is some sample output.</a:t>
-            </a:r>
-          </a:p>
-        </p:txBody>
-      </p:sp>
-    </p:spTree>
-    <p:extLst>
-      <p:ext uri="{BB962C8B-B14F-4D97-AF65-F5344CB8AC3E}">
-        <p14:creationId xmlns:p14="http://schemas.microsoft.com/office/powerpoint/2010/main" val="1864654678"/>
-      </p:ext>
-    </p:extLst>
-  </p:cSld>
-  <p:clrMapOvr>
-    <a:masterClrMapping/>
-  </p:clrMapOvr>
-</p:notes>
-</file>
-
-<file path=ppt/notesSlides/notesSlide34.xml><?xml version="1.0" encoding="utf-8"?>
-<p:notes xmlns:a="http://schemas.openxmlformats.org/drawingml/2006/main" xmlns:r="http://schemas.openxmlformats.org/officeDocument/2006/relationships" xmlns:p="http://schemas.openxmlformats.org/presentationml/2006/main">
-  <p:cSld>
-    <p:spTree>
-      <p:nvGrpSpPr>
-        <p:cNvPr id="1" name=""/>
-        <p:cNvGrpSpPr/>
-        <p:nvPr/>
-      </p:nvGrpSpPr>
-      <p:grpSpPr>
-        <a:xfrm>
-          <a:off x="0" y="0"/>
-          <a:ext cx="0" cy="0"/>
-          <a:chOff x="0" y="0"/>
-          <a:chExt cx="0" cy="0"/>
-        </a:xfrm>
-      </p:grpSpPr>
-      <p:sp>
-        <p:nvSpPr>
-          <p:cNvPr id="884" name="Shape 884"/>
-          <p:cNvSpPr>
-            <a:spLocks noGrp="1" noRot="1" noChangeAspect="1"/>
-          </p:cNvSpPr>
-          <p:nvPr>
-            <p:ph type="sldImg"/>
-          </p:nvPr>
-        </p:nvSpPr>
-        <p:spPr>
-          <a:prstGeom prst="rect">
-            <a:avLst/>
-          </a:prstGeom>
-        </p:spPr>
-        <p:txBody>
-          <a:bodyPr/>
-          <a:lstStyle/>
-          <a:p>
-            <a:endParaRPr/>
-          </a:p>
-        </p:txBody>
-      </p:sp>
-      <p:sp>
-        <p:nvSpPr>
-          <p:cNvPr id="885" name="Shape 885"/>
-          <p:cNvSpPr>
-            <a:spLocks noGrp="1"/>
-          </p:cNvSpPr>
-          <p:nvPr>
-            <p:ph type="body" sz="quarter" idx="1"/>
-          </p:nvPr>
-        </p:nvSpPr>
-        <p:spPr>
-          <a:prstGeom prst="rect">
-            <a:avLst/>
-          </a:prstGeom>
-        </p:spPr>
-        <p:txBody>
-          <a:bodyPr/>
-          <a:lstStyle/>
-          <a:p>
-            <a:endParaRPr dirty="0"/>
-          </a:p>
-        </p:txBody>
-      </p:sp>
-    </p:spTree>
-    <p:extLst>
-      <p:ext uri="{BB962C8B-B14F-4D97-AF65-F5344CB8AC3E}">
-        <p14:creationId xmlns:p14="http://schemas.microsoft.com/office/powerpoint/2010/main" val="1749781969"/>
-      </p:ext>
-    </p:extLst>
-  </p:cSld>
-  <p:clrMapOvr>
-    <a:masterClrMapping/>
-  </p:clrMapOvr>
-</p:notes>
-</file>
-
 <file path=ppt/notesSlides/notesSlide4.xml><?xml version="1.0" encoding="utf-8"?>
 <p:notes xmlns:a="http://schemas.openxmlformats.org/drawingml/2006/main" xmlns:r="http://schemas.openxmlformats.org/officeDocument/2006/relationships" xmlns:p="http://schemas.openxmlformats.org/presentationml/2006/main">
   <p:cSld>
@@ -3440,7 +3192,7 @@
           <a:p>
             <a:fld id="{068273B9-F59E-6D44-86B9-11E805B7C264}" type="datetimeFigureOut">
               <a:rPr lang="en-US" smtClean="0"/>
-              <a:t>1/2/18</a:t>
+              <a:t>1/3/18</a:t>
             </a:fld>
             <a:endParaRPr lang="en-US"/>
           </a:p>
@@ -3610,7 +3362,7 @@
           <a:p>
             <a:fld id="{068273B9-F59E-6D44-86B9-11E805B7C264}" type="datetimeFigureOut">
               <a:rPr lang="en-US" smtClean="0"/>
-              <a:t>1/2/18</a:t>
+              <a:t>1/3/18</a:t>
             </a:fld>
             <a:endParaRPr lang="en-US"/>
           </a:p>
@@ -3790,7 +3542,7 @@
           <a:p>
             <a:fld id="{068273B9-F59E-6D44-86B9-11E805B7C264}" type="datetimeFigureOut">
               <a:rPr lang="en-US" smtClean="0"/>
-              <a:t>1/2/18</a:t>
+              <a:t>1/3/18</a:t>
             </a:fld>
             <a:endParaRPr lang="en-US"/>
           </a:p>
@@ -5571,7 +5323,7 @@
           <a:p>
             <a:fld id="{068273B9-F59E-6D44-86B9-11E805B7C264}" type="datetimeFigureOut">
               <a:rPr lang="en-US" smtClean="0"/>
-              <a:t>1/2/18</a:t>
+              <a:t>1/3/18</a:t>
             </a:fld>
             <a:endParaRPr lang="en-US"/>
           </a:p>
@@ -8021,7 +7773,7 @@
           <a:p>
             <a:fld id="{068273B9-F59E-6D44-86B9-11E805B7C264}" type="datetimeFigureOut">
               <a:rPr lang="en-US" smtClean="0"/>
-              <a:t>1/2/18</a:t>
+              <a:t>1/3/18</a:t>
             </a:fld>
             <a:endParaRPr lang="en-US"/>
           </a:p>
@@ -10530,7 +10282,7 @@
           <a:p>
             <a:fld id="{068273B9-F59E-6D44-86B9-11E805B7C264}" type="datetimeFigureOut">
               <a:rPr lang="en-US" smtClean="0"/>
-              <a:t>1/2/18</a:t>
+              <a:t>1/3/18</a:t>
             </a:fld>
             <a:endParaRPr lang="en-US"/>
           </a:p>
@@ -13032,7 +12784,7 @@
           <a:p>
             <a:fld id="{068273B9-F59E-6D44-86B9-11E805B7C264}" type="datetimeFigureOut">
               <a:rPr lang="en-US" smtClean="0"/>
-              <a:t>1/2/18</a:t>
+              <a:t>1/3/18</a:t>
             </a:fld>
             <a:endParaRPr lang="en-US"/>
           </a:p>
@@ -15218,7 +14970,7 @@
           <a:p>
             <a:fld id="{068273B9-F59E-6D44-86B9-11E805B7C264}" type="datetimeFigureOut">
               <a:rPr lang="en-US" smtClean="0"/>
-              <a:t>1/2/18</a:t>
+              <a:t>1/3/18</a:t>
             </a:fld>
             <a:endParaRPr lang="en-US"/>
           </a:p>
@@ -17410,7 +17162,7 @@
           <a:p>
             <a:fld id="{068273B9-F59E-6D44-86B9-11E805B7C264}" type="datetimeFigureOut">
               <a:rPr lang="en-US" smtClean="0"/>
-              <a:t>1/2/18</a:t>
+              <a:t>1/3/18</a:t>
             </a:fld>
             <a:endParaRPr lang="en-US"/>
           </a:p>
@@ -18990,7 +18742,7 @@
           <a:p>
             <a:fld id="{068273B9-F59E-6D44-86B9-11E805B7C264}" type="datetimeFigureOut">
               <a:rPr lang="en-US" smtClean="0"/>
-              <a:t>1/2/18</a:t>
+              <a:t>1/3/18</a:t>
             </a:fld>
             <a:endParaRPr lang="en-US"/>
           </a:p>
@@ -19243,7 +18995,7 @@
           <a:p>
             <a:fld id="{068273B9-F59E-6D44-86B9-11E805B7C264}" type="datetimeFigureOut">
               <a:rPr lang="en-US" smtClean="0"/>
-              <a:t>1/2/18</a:t>
+              <a:t>1/3/18</a:t>
             </a:fld>
             <a:endParaRPr lang="en-US"/>
           </a:p>
@@ -19456,7 +19208,7 @@
           <a:p>
             <a:fld id="{068273B9-F59E-6D44-86B9-11E805B7C264}" type="datetimeFigureOut">
               <a:rPr lang="en-US" smtClean="0"/>
-              <a:t>1/2/18</a:t>
+              <a:t>1/3/18</a:t>
             </a:fld>
             <a:endParaRPr lang="en-US"/>
           </a:p>
@@ -29138,7 +28890,6 @@
               <a:rPr lang="en-CA" dirty="0" smtClean="0"/>
               <a:t>Quiz</a:t>
             </a:r>
-            <a:endParaRPr lang="en-CA" dirty="0" smtClean="0"/>
           </a:p>
           <a:p>
             <a:pPr marL="289560" indent="-289560" defTabSz="235267">
@@ -32831,7 +32582,6 @@
               <a:rPr lang="en-US" dirty="0"/>
               <a:t> Three Levels of Precedence </a:t>
             </a:r>
-            <a:endParaRPr lang="en-US" dirty="0"/>
           </a:p>
         </p:txBody>
       </p:sp>
@@ -32886,14 +32636,21 @@
               <a:t> or </a:t>
             </a:r>
             <a:r>
+              <a:rPr lang="en-US" dirty="0"/>
+              <a:t>*</a:t>
+            </a:r>
+            <a:r>
+              <a:rPr lang="en-US" dirty="0" smtClean="0"/>
+              <a:t>.</a:t>
+            </a:r>
+            <a:r>
               <a:rPr lang="en-US" dirty="0" err="1" smtClean="0"/>
-              <a:t>variables.tf</a:t>
+              <a:t>tf</a:t>
             </a:r>
             <a:r>
               <a:rPr lang="en-US" dirty="0" smtClean="0"/>
               <a:t> Terraform will automatically load it to populate the variables</a:t>
             </a:r>
-            <a:endParaRPr lang="en-US" dirty="0" smtClean="0"/>
           </a:p>
         </p:txBody>
       </p:sp>
@@ -32955,7 +32712,6 @@
               <a:rPr lang="en-US" dirty="0"/>
               <a:t> Three Levels of Precedence </a:t>
             </a:r>
-            <a:endParaRPr lang="en-US" dirty="0"/>
           </a:p>
         </p:txBody>
       </p:sp>
@@ -34295,7 +34051,7 @@
               <a:tabLst/>
             </a:pPr>
             <a:r>
-              <a:rPr lang="en-US" sz="4600" dirty="0" err="1">
+              <a:rPr lang="en-US" sz="4600" dirty="0" smtClean="0">
                 <a:solidFill>
                   <a:schemeClr val="bg2">
                     <a:lumMod val="50000"/>
@@ -34303,7 +34059,7 @@
                 </a:solidFill>
                 <a:sym typeface="Klavika Basic Light"/>
               </a:rPr>
-              <a:t>v</a:t>
+              <a:t>_</a:t>
             </a:r>
             <a:r>
               <a:rPr lang="en-US" sz="4600" dirty="0" err="1" smtClean="0">
@@ -34314,7 +34070,7 @@
                 </a:solidFill>
                 <a:sym typeface="Klavika Basic Light"/>
               </a:rPr>
-              <a:t>ariables.tf</a:t>
+              <a:t>interface.tf</a:t>
             </a:r>
             <a:endParaRPr kumimoji="0" lang="en-US" sz="4600" b="0" i="0" u="none" strike="noStrike" cap="none" spc="0" normalizeH="0" baseline="0" dirty="0">
               <a:ln>
@@ -34502,11 +34258,11 @@
             </a:r>
             <a:r>
               <a:rPr lang="en-CA" dirty="0" smtClean="0"/>
-              <a:t>vim </a:t>
+              <a:t>vim _</a:t>
             </a:r>
             <a:r>
               <a:rPr lang="en-CA" dirty="0" err="1" smtClean="0"/>
-              <a:t>variables.tf</a:t>
+              <a:t>interface.tf</a:t>
             </a:r>
             <a:endParaRPr dirty="0"/>
           </a:p>
@@ -34580,8 +34336,12 @@
           </a:lstStyle>
           <a:p>
             <a:r>
+              <a:rPr lang="en-CA" dirty="0" smtClean="0"/>
+              <a:t>_</a:t>
+            </a:r>
+            <a:r>
               <a:rPr lang="en-CA" dirty="0" err="1" smtClean="0"/>
-              <a:t>Variables.tf</a:t>
+              <a:t>interface.tf</a:t>
             </a:r>
             <a:endParaRPr dirty="0"/>
           </a:p>
@@ -34970,8 +34730,12 @@
           </a:lstStyle>
           <a:p>
             <a:r>
+              <a:rPr lang="en-CA" dirty="0" smtClean="0"/>
+              <a:t>_</a:t>
+            </a:r>
+            <a:r>
               <a:rPr lang="en-CA" dirty="0" err="1" smtClean="0"/>
-              <a:t>Variables.tf</a:t>
+              <a:t>interface.tf</a:t>
             </a:r>
             <a:endParaRPr dirty="0"/>
           </a:p>
@@ -35702,11 +35466,6 @@
               </a:rPr>
               <a:t>to local or remote state storage.</a:t>
             </a:r>
-            <a:endParaRPr lang="en-US" sz="1400" dirty="0">
-              <a:solidFill>
-                <a:schemeClr val="tx1"/>
-              </a:solidFill>
-            </a:endParaRPr>
           </a:p>
           <a:p>
             <a:pPr algn="l">
@@ -36401,16 +36160,16 @@
               <a:t>name </a:t>
             </a:r>
             <a:r>
-              <a:rPr lang="mr-IN" dirty="0" smtClean="0"/>
+              <a:rPr lang="mr-IN" smtClean="0"/>
               <a:t>–</a:t>
             </a:r>
             <a:r>
-              <a:rPr lang="en-CA" dirty="0" smtClean="0"/>
+              <a:rPr lang="en-CA" smtClean="0"/>
               <a:t> </a:t>
             </a:r>
             <a:r>
-              <a:rPr lang="en-CA" dirty="0" err="1" smtClean="0"/>
-              <a:t>my_first_vn</a:t>
+              <a:rPr lang="en-CA" smtClean="0"/>
+              <a:t>myfirstvn</a:t>
             </a:r>
             <a:endParaRPr lang="en-CA" dirty="0" smtClean="0"/>
           </a:p>
@@ -37053,8 +36812,12 @@
           </a:lstStyle>
           <a:p>
             <a:r>
+              <a:rPr lang="en-CA" dirty="0" smtClean="0"/>
+              <a:t>_</a:t>
+            </a:r>
+            <a:r>
               <a:rPr lang="en-CA" dirty="0" err="1" smtClean="0"/>
-              <a:t>Variables.tf</a:t>
+              <a:t>interface.tf</a:t>
             </a:r>
             <a:endParaRPr dirty="0"/>
           </a:p>
@@ -37293,14 +37056,14 @@
               <a:t>= "</a:t>
             </a:r>
             <a:r>
-              <a:rPr lang="en-US" sz="2000" dirty="0" err="1">
+              <a:rPr lang="en-US" sz="2000" dirty="0" err="1" smtClean="0">
                 <a:solidFill>
                   <a:schemeClr val="tx2">
                     <a:lumMod val="10000"/>
                   </a:schemeClr>
                 </a:solidFill>
               </a:rPr>
-              <a:t>my_first_vn</a:t>
+              <a:t>myfirstvn</a:t>
             </a:r>
             <a:r>
               <a:rPr lang="en-US" sz="2000" dirty="0">
@@ -37821,8 +37584,12 @@
           </a:lstStyle>
           <a:p>
             <a:r>
+              <a:rPr lang="en-CA" dirty="0" smtClean="0"/>
+              <a:t>_</a:t>
+            </a:r>
+            <a:r>
               <a:rPr lang="en-CA" dirty="0" err="1" smtClean="0"/>
-              <a:t>Variables.tf</a:t>
+              <a:t>interface.tf</a:t>
             </a:r>
             <a:endParaRPr dirty="0"/>
           </a:p>
@@ -40114,7 +39881,6 @@
               <a:rPr lang="en-CA" dirty="0" smtClean="0"/>
               <a:t>What are some components of a Resource?</a:t>
             </a:r>
-            <a:endParaRPr lang="en-CA" dirty="0" smtClean="0"/>
           </a:p>
           <a:p>
             <a:pPr marL="289560" indent="-289560" defTabSz="235267">
@@ -40129,7 +39895,6 @@
               <a:rPr lang="en-CA" dirty="0" smtClean="0"/>
               <a:t>What is an Azure Virtual Network?</a:t>
             </a:r>
-            <a:endParaRPr lang="en-CA" dirty="0" smtClean="0"/>
           </a:p>
           <a:p>
             <a:pPr marL="289560" indent="-289560" defTabSz="235267">
@@ -40257,213 +40022,6 @@
 </p:sld>
 </file>
 
-<file path=ppt/slides/slide57.xml><?xml version="1.0" encoding="utf-8"?>
-<p:sld xmlns:a="http://schemas.openxmlformats.org/drawingml/2006/main" xmlns:r="http://schemas.openxmlformats.org/officeDocument/2006/relationships" xmlns:p="http://schemas.openxmlformats.org/presentationml/2006/main">
-  <p:cSld>
-    <p:spTree>
-      <p:nvGrpSpPr>
-        <p:cNvPr id="1" name=""/>
-        <p:cNvGrpSpPr/>
-        <p:nvPr/>
-      </p:nvGrpSpPr>
-      <p:grpSpPr>
-        <a:xfrm>
-          <a:off x="0" y="0"/>
-          <a:ext cx="0" cy="0"/>
-          <a:chOff x="0" y="0"/>
-          <a:chExt cx="0" cy="0"/>
-        </a:xfrm>
-      </p:grpSpPr>
-      <p:sp>
-        <p:nvSpPr>
-          <p:cNvPr id="2" name="Title 1"/>
-          <p:cNvSpPr>
-            <a:spLocks noGrp="1"/>
-          </p:cNvSpPr>
-          <p:nvPr>
-            <p:ph type="title"/>
-          </p:nvPr>
-        </p:nvSpPr>
-        <p:spPr/>
-        <p:txBody>
-          <a:bodyPr/>
-          <a:lstStyle/>
-          <a:p>
-            <a:endParaRPr lang="en-US"/>
-          </a:p>
-        </p:txBody>
-      </p:sp>
-      <p:sp>
-        <p:nvSpPr>
-          <p:cNvPr id="3" name="Text Placeholder 2"/>
-          <p:cNvSpPr>
-            <a:spLocks noGrp="1"/>
-          </p:cNvSpPr>
-          <p:nvPr>
-            <p:ph type="body" idx="1"/>
-          </p:nvPr>
-        </p:nvSpPr>
-        <p:spPr/>
-        <p:txBody>
-          <a:bodyPr/>
-          <a:lstStyle/>
-          <a:p>
-            <a:endParaRPr lang="en-US"/>
-          </a:p>
-        </p:txBody>
-      </p:sp>
-    </p:spTree>
-    <p:extLst>
-      <p:ext uri="{BB962C8B-B14F-4D97-AF65-F5344CB8AC3E}">
-        <p14:creationId xmlns:p14="http://schemas.microsoft.com/office/powerpoint/2010/main" val="1719034422"/>
-      </p:ext>
-    </p:extLst>
-  </p:cSld>
-  <p:clrMapOvr>
-    <a:masterClrMapping/>
-  </p:clrMapOvr>
-  <p:transition spd="med"/>
-</p:sld>
-</file>
-
-<file path=ppt/slides/slide58.xml><?xml version="1.0" encoding="utf-8"?>
-<p:sld xmlns:a="http://schemas.openxmlformats.org/drawingml/2006/main" xmlns:r="http://schemas.openxmlformats.org/officeDocument/2006/relationships" xmlns:p="http://schemas.openxmlformats.org/presentationml/2006/main">
-  <p:cSld>
-    <p:spTree>
-      <p:nvGrpSpPr>
-        <p:cNvPr id="1" name=""/>
-        <p:cNvGrpSpPr/>
-        <p:nvPr/>
-      </p:nvGrpSpPr>
-      <p:grpSpPr>
-        <a:xfrm>
-          <a:off x="0" y="0"/>
-          <a:ext cx="0" cy="0"/>
-          <a:chOff x="0" y="0"/>
-          <a:chExt cx="0" cy="0"/>
-        </a:xfrm>
-      </p:grpSpPr>
-      <p:sp>
-        <p:nvSpPr>
-          <p:cNvPr id="2" name="Title 1"/>
-          <p:cNvSpPr>
-            <a:spLocks noGrp="1"/>
-          </p:cNvSpPr>
-          <p:nvPr>
-            <p:ph type="title"/>
-          </p:nvPr>
-        </p:nvSpPr>
-        <p:spPr/>
-        <p:txBody>
-          <a:bodyPr/>
-          <a:lstStyle/>
-          <a:p>
-            <a:endParaRPr lang="en-US"/>
-          </a:p>
-        </p:txBody>
-      </p:sp>
-      <p:sp>
-        <p:nvSpPr>
-          <p:cNvPr id="3" name="Text Placeholder 2"/>
-          <p:cNvSpPr>
-            <a:spLocks noGrp="1"/>
-          </p:cNvSpPr>
-          <p:nvPr>
-            <p:ph type="body" idx="1"/>
-          </p:nvPr>
-        </p:nvSpPr>
-        <p:spPr/>
-        <p:txBody>
-          <a:bodyPr/>
-          <a:lstStyle/>
-          <a:p>
-            <a:endParaRPr lang="en-US"/>
-          </a:p>
-        </p:txBody>
-      </p:sp>
-    </p:spTree>
-    <p:extLst>
-      <p:ext uri="{BB962C8B-B14F-4D97-AF65-F5344CB8AC3E}">
-        <p14:creationId xmlns:p14="http://schemas.microsoft.com/office/powerpoint/2010/main" val="1714027463"/>
-      </p:ext>
-    </p:extLst>
-  </p:cSld>
-  <p:clrMapOvr>
-    <a:masterClrMapping/>
-  </p:clrMapOvr>
-  <p:transition spd="med"/>
-</p:sld>
-</file>
-
-<file path=ppt/slides/slide59.xml><?xml version="1.0" encoding="utf-8"?>
-<p:sld xmlns:a="http://schemas.openxmlformats.org/drawingml/2006/main" xmlns:r="http://schemas.openxmlformats.org/officeDocument/2006/relationships" xmlns:p="http://schemas.openxmlformats.org/presentationml/2006/main">
-  <p:cSld>
-    <p:spTree>
-      <p:nvGrpSpPr>
-        <p:cNvPr id="1" name=""/>
-        <p:cNvGrpSpPr/>
-        <p:nvPr/>
-      </p:nvGrpSpPr>
-      <p:grpSpPr>
-        <a:xfrm>
-          <a:off x="0" y="0"/>
-          <a:ext cx="0" cy="0"/>
-          <a:chOff x="0" y="0"/>
-          <a:chExt cx="0" cy="0"/>
-        </a:xfrm>
-      </p:grpSpPr>
-      <p:sp>
-        <p:nvSpPr>
-          <p:cNvPr id="2" name="Title 1"/>
-          <p:cNvSpPr>
-            <a:spLocks noGrp="1"/>
-          </p:cNvSpPr>
-          <p:nvPr>
-            <p:ph type="title"/>
-          </p:nvPr>
-        </p:nvSpPr>
-        <p:spPr/>
-        <p:txBody>
-          <a:bodyPr/>
-          <a:lstStyle/>
-          <a:p>
-            <a:endParaRPr lang="en-US"/>
-          </a:p>
-        </p:txBody>
-      </p:sp>
-      <p:sp>
-        <p:nvSpPr>
-          <p:cNvPr id="3" name="Text Placeholder 2"/>
-          <p:cNvSpPr>
-            <a:spLocks noGrp="1"/>
-          </p:cNvSpPr>
-          <p:nvPr>
-            <p:ph type="body" idx="1"/>
-          </p:nvPr>
-        </p:nvSpPr>
-        <p:spPr/>
-        <p:txBody>
-          <a:bodyPr/>
-          <a:lstStyle/>
-          <a:p>
-            <a:endParaRPr lang="en-US"/>
-          </a:p>
-        </p:txBody>
-      </p:sp>
-    </p:spTree>
-    <p:extLst>
-      <p:ext uri="{BB962C8B-B14F-4D97-AF65-F5344CB8AC3E}">
-        <p14:creationId xmlns:p14="http://schemas.microsoft.com/office/powerpoint/2010/main" val="1313929783"/>
-      </p:ext>
-    </p:extLst>
-  </p:cSld>
-  <p:clrMapOvr>
-    <a:masterClrMapping/>
-  </p:clrMapOvr>
-  <p:transition spd="med"/>
-</p:sld>
-</file>
-
 <file path=ppt/slides/slide6.xml><?xml version="1.0" encoding="utf-8"?>
 <p:sld xmlns:a="http://schemas.openxmlformats.org/drawingml/2006/main" xmlns:r="http://schemas.openxmlformats.org/officeDocument/2006/relationships" xmlns:p="http://schemas.openxmlformats.org/presentationml/2006/main">
   <p:cSld>
@@ -40596,1583 +40154,6 @@
     <p:extLst>
       <p:ext uri="{BB962C8B-B14F-4D97-AF65-F5344CB8AC3E}">
         <p14:creationId xmlns:p14="http://schemas.microsoft.com/office/powerpoint/2010/main" val="209559530"/>
-      </p:ext>
-    </p:extLst>
-  </p:cSld>
-  <p:clrMapOvr>
-    <a:masterClrMapping/>
-  </p:clrMapOvr>
-  <p:transition spd="med"/>
-</p:sld>
-</file>
-
-<file path=ppt/slides/slide60.xml><?xml version="1.0" encoding="utf-8"?>
-<p:sld xmlns:a="http://schemas.openxmlformats.org/drawingml/2006/main" xmlns:r="http://schemas.openxmlformats.org/officeDocument/2006/relationships" xmlns:p="http://schemas.openxmlformats.org/presentationml/2006/main">
-  <p:cSld>
-    <p:spTree>
-      <p:nvGrpSpPr>
-        <p:cNvPr id="1" name=""/>
-        <p:cNvGrpSpPr/>
-        <p:nvPr/>
-      </p:nvGrpSpPr>
-      <p:grpSpPr>
-        <a:xfrm>
-          <a:off x="0" y="0"/>
-          <a:ext cx="0" cy="0"/>
-          <a:chOff x="0" y="0"/>
-          <a:chExt cx="0" cy="0"/>
-        </a:xfrm>
-      </p:grpSpPr>
-      <p:sp>
-        <p:nvSpPr>
-          <p:cNvPr id="2" name="Title 1"/>
-          <p:cNvSpPr>
-            <a:spLocks noGrp="1"/>
-          </p:cNvSpPr>
-          <p:nvPr>
-            <p:ph type="title"/>
-          </p:nvPr>
-        </p:nvSpPr>
-        <p:spPr/>
-        <p:txBody>
-          <a:bodyPr/>
-          <a:lstStyle/>
-          <a:p>
-            <a:endParaRPr lang="en-US"/>
-          </a:p>
-        </p:txBody>
-      </p:sp>
-      <p:sp>
-        <p:nvSpPr>
-          <p:cNvPr id="3" name="Text Placeholder 2"/>
-          <p:cNvSpPr>
-            <a:spLocks noGrp="1"/>
-          </p:cNvSpPr>
-          <p:nvPr>
-            <p:ph type="body" idx="1"/>
-          </p:nvPr>
-        </p:nvSpPr>
-        <p:spPr/>
-        <p:txBody>
-          <a:bodyPr/>
-          <a:lstStyle/>
-          <a:p>
-            <a:endParaRPr lang="en-US"/>
-          </a:p>
-        </p:txBody>
-      </p:sp>
-    </p:spTree>
-    <p:extLst>
-      <p:ext uri="{BB962C8B-B14F-4D97-AF65-F5344CB8AC3E}">
-        <p14:creationId xmlns:p14="http://schemas.microsoft.com/office/powerpoint/2010/main" val="643520780"/>
-      </p:ext>
-    </p:extLst>
-  </p:cSld>
-  <p:clrMapOvr>
-    <a:masterClrMapping/>
-  </p:clrMapOvr>
-  <p:transition spd="med"/>
-</p:sld>
-</file>
-
-<file path=ppt/slides/slide61.xml><?xml version="1.0" encoding="utf-8"?>
-<p:sld xmlns:a="http://schemas.openxmlformats.org/drawingml/2006/main" xmlns:r="http://schemas.openxmlformats.org/officeDocument/2006/relationships" xmlns:p="http://schemas.openxmlformats.org/presentationml/2006/main">
-  <p:cSld>
-    <p:spTree>
-      <p:nvGrpSpPr>
-        <p:cNvPr id="1" name=""/>
-        <p:cNvGrpSpPr/>
-        <p:nvPr/>
-      </p:nvGrpSpPr>
-      <p:grpSpPr>
-        <a:xfrm>
-          <a:off x="0" y="0"/>
-          <a:ext cx="0" cy="0"/>
-          <a:chOff x="0" y="0"/>
-          <a:chExt cx="0" cy="0"/>
-        </a:xfrm>
-      </p:grpSpPr>
-      <p:sp>
-        <p:nvSpPr>
-          <p:cNvPr id="1144" name="Exercise: Create Variables"/>
-          <p:cNvSpPr txBox="1">
-            <a:spLocks noGrp="1"/>
-          </p:cNvSpPr>
-          <p:nvPr>
-            <p:ph type="title"/>
-          </p:nvPr>
-        </p:nvSpPr>
-        <p:spPr>
-          <a:prstGeom prst="rect">
-            <a:avLst/>
-          </a:prstGeom>
-        </p:spPr>
-        <p:txBody>
-          <a:bodyPr/>
-          <a:lstStyle/>
-          <a:p>
-            <a:r>
-              <a:t>Exercise: Create Variables</a:t>
-            </a:r>
-          </a:p>
-        </p:txBody>
-      </p:sp>
-      <p:sp>
-        <p:nvSpPr>
-          <p:cNvPr id="1145" name="Create three variables in the Terraform configuration:…"/>
-          <p:cNvSpPr txBox="1">
-            <a:spLocks noGrp="1"/>
-          </p:cNvSpPr>
-          <p:nvPr>
-            <p:ph type="body" idx="1"/>
-          </p:nvPr>
-        </p:nvSpPr>
-        <p:spPr>
-          <a:prstGeom prst="rect">
-            <a:avLst/>
-          </a:prstGeom>
-        </p:spPr>
-        <p:txBody>
-          <a:bodyPr/>
-          <a:lstStyle/>
-          <a:p>
-            <a:r>
-              <a:rPr dirty="0"/>
-              <a:t>Create </a:t>
-            </a:r>
-            <a:r>
-              <a:rPr lang="en-CA" dirty="0" smtClean="0"/>
-              <a:t>four </a:t>
-            </a:r>
-            <a:r>
-              <a:rPr dirty="0" smtClean="0"/>
-              <a:t>variables </a:t>
-            </a:r>
-            <a:r>
-              <a:rPr dirty="0"/>
-              <a:t>in the Terraform </a:t>
-            </a:r>
-            <a:r>
-              <a:rPr dirty="0" smtClean="0"/>
-              <a:t>configuration</a:t>
-            </a:r>
-            <a:r>
-              <a:rPr lang="en-CA" dirty="0" smtClean="0"/>
-              <a:t>;</a:t>
-            </a:r>
-          </a:p>
-          <a:p>
-            <a:pPr marL="457200" indent="-457200">
-              <a:buFont typeface="Arial" charset="0"/>
-              <a:buChar char="•"/>
-            </a:pPr>
-            <a:r>
-              <a:rPr lang="en-CA" dirty="0" err="1" smtClean="0"/>
-              <a:t>subscription_id</a:t>
-            </a:r>
-            <a:endParaRPr lang="en-CA" dirty="0" smtClean="0"/>
-          </a:p>
-          <a:p>
-            <a:pPr marL="457200" indent="-457200">
-              <a:buFont typeface="Arial" charset="0"/>
-              <a:buChar char="•"/>
-            </a:pPr>
-            <a:r>
-              <a:rPr lang="en-CA" dirty="0" err="1" smtClean="0"/>
-              <a:t>client_id</a:t>
-            </a:r>
-            <a:endParaRPr lang="en-CA" dirty="0" smtClean="0"/>
-          </a:p>
-          <a:p>
-            <a:pPr marL="457200" indent="-457200">
-              <a:buFont typeface="Arial" charset="0"/>
-              <a:buChar char="•"/>
-            </a:pPr>
-            <a:r>
-              <a:rPr lang="en-CA" dirty="0" err="1" smtClean="0"/>
-              <a:t>client_secret</a:t>
-            </a:r>
-            <a:endParaRPr lang="en-CA" dirty="0" smtClean="0"/>
-          </a:p>
-          <a:p>
-            <a:pPr marL="457200" indent="-457200">
-              <a:buFont typeface="Arial" charset="0"/>
-              <a:buChar char="•"/>
-            </a:pPr>
-            <a:r>
-              <a:rPr lang="en-CA" dirty="0" err="1"/>
-              <a:t>t</a:t>
-            </a:r>
-            <a:r>
-              <a:rPr lang="en-CA" dirty="0" err="1" smtClean="0"/>
-              <a:t>enant_id</a:t>
-            </a:r>
-            <a:endParaRPr lang="en-CA" dirty="0"/>
-          </a:p>
-        </p:txBody>
-      </p:sp>
-    </p:spTree>
-    <p:extLst>
-      <p:ext uri="{BB962C8B-B14F-4D97-AF65-F5344CB8AC3E}">
-        <p14:creationId xmlns:p14="http://schemas.microsoft.com/office/powerpoint/2010/main" val="1167513696"/>
-      </p:ext>
-    </p:extLst>
-  </p:cSld>
-  <p:clrMapOvr>
-    <a:masterClrMapping/>
-  </p:clrMapOvr>
-  <p:transition spd="med"/>
-</p:sld>
-</file>
-
-<file path=ppt/slides/slide62.xml><?xml version="1.0" encoding="utf-8"?>
-<p:sld xmlns:a="http://schemas.openxmlformats.org/drawingml/2006/main" xmlns:r="http://schemas.openxmlformats.org/officeDocument/2006/relationships" xmlns:p="http://schemas.openxmlformats.org/presentationml/2006/main">
-  <p:cSld>
-    <p:spTree>
-      <p:nvGrpSpPr>
-        <p:cNvPr id="1" name=""/>
-        <p:cNvGrpSpPr/>
-        <p:nvPr/>
-      </p:nvGrpSpPr>
-      <p:grpSpPr>
-        <a:xfrm>
-          <a:off x="0" y="0"/>
-          <a:ext cx="0" cy="0"/>
-          <a:chOff x="0" y="0"/>
-          <a:chExt cx="0" cy="0"/>
-        </a:xfrm>
-      </p:grpSpPr>
-      <p:sp>
-        <p:nvSpPr>
-          <p:cNvPr id="818" name="resource &quot;aws_instance&quot; &quot;web&quot; {…"/>
-          <p:cNvSpPr txBox="1">
-            <a:spLocks noGrp="1"/>
-          </p:cNvSpPr>
-          <p:nvPr>
-            <p:ph type="body" idx="13"/>
-          </p:nvPr>
-        </p:nvSpPr>
-        <p:spPr>
-          <a:xfrm>
-            <a:off x="3128486" y="1293828"/>
-            <a:ext cx="8335328" cy="4774640"/>
-          </a:xfrm>
-          <a:prstGeom prst="rect">
-            <a:avLst/>
-          </a:prstGeom>
-          <a:extLst>
-            <a:ext uri="{C572A759-6A51-4108-AA02-DFA0A04FC94B}">
-              <ma14:wrappingTextBoxFlag xmlns:ma14="http://schemas.microsoft.com/office/mac/drawingml/2011/main" val="1"/>
-            </a:ext>
-          </a:extLst>
-        </p:spPr>
-        <p:txBody>
-          <a:bodyPr/>
-          <a:lstStyle/>
-          <a:p>
-            <a:pPr algn="l">
-              <a:lnSpc>
-                <a:spcPct val="120000"/>
-              </a:lnSpc>
-              <a:defRPr sz="2800">
-                <a:latin typeface="Courier"/>
-                <a:ea typeface="Courier"/>
-                <a:cs typeface="Courier"/>
-                <a:sym typeface="Courier"/>
-              </a:defRPr>
-            </a:pPr>
-            <a:r>
-              <a:rPr lang="mr-IN" sz="2300" dirty="0" err="1"/>
-              <a:t>provider</a:t>
-            </a:r>
-            <a:r>
-              <a:rPr lang="mr-IN" sz="2300" dirty="0"/>
-              <a:t> "</a:t>
-            </a:r>
-            <a:r>
-              <a:rPr lang="mr-IN" sz="2300" dirty="0" err="1"/>
-              <a:t>azurerm</a:t>
-            </a:r>
-            <a:r>
-              <a:rPr lang="mr-IN" sz="2300" dirty="0"/>
-              <a:t>" {  </a:t>
-            </a:r>
-            <a:endParaRPr lang="en-CA" sz="2300" dirty="0" smtClean="0"/>
-          </a:p>
-          <a:p>
-            <a:pPr algn="l">
-              <a:lnSpc>
-                <a:spcPct val="120000"/>
-              </a:lnSpc>
-              <a:defRPr sz="2800">
-                <a:latin typeface="Courier"/>
-                <a:ea typeface="Courier"/>
-                <a:cs typeface="Courier"/>
-                <a:sym typeface="Courier"/>
-              </a:defRPr>
-            </a:pPr>
-            <a:r>
-              <a:rPr lang="en-CA" sz="2300" dirty="0"/>
-              <a:t>	</a:t>
-            </a:r>
-            <a:r>
-              <a:rPr lang="mr-IN" sz="2300" dirty="0" err="1" smtClean="0"/>
-              <a:t>subscription_id</a:t>
-            </a:r>
-            <a:r>
-              <a:rPr lang="mr-IN" sz="2300" dirty="0" smtClean="0"/>
-              <a:t> </a:t>
-            </a:r>
-            <a:r>
-              <a:rPr lang="mr-IN" sz="2300" dirty="0"/>
-              <a:t>= </a:t>
-            </a:r>
-            <a:r>
-              <a:rPr lang="mr-IN" sz="2300" dirty="0" smtClean="0"/>
-              <a:t>”</a:t>
-            </a:r>
-            <a:r>
-              <a:rPr lang="en-CA" sz="2300" dirty="0" err="1" smtClean="0"/>
-              <a:t>aaaa-bbbb-cccc-dddd</a:t>
-            </a:r>
-            <a:r>
-              <a:rPr lang="mr-IN" sz="2300" dirty="0" smtClean="0"/>
-              <a:t>"  </a:t>
-            </a:r>
-            <a:r>
-              <a:rPr lang="en-CA" sz="2300" dirty="0" smtClean="0"/>
-              <a:t>	</a:t>
-            </a:r>
-            <a:r>
-              <a:rPr lang="mr-IN" sz="2300" dirty="0" err="1" smtClean="0"/>
-              <a:t>client_id</a:t>
-            </a:r>
-            <a:r>
-              <a:rPr lang="mr-IN" sz="2300" dirty="0" smtClean="0"/>
-              <a:t>       </a:t>
-            </a:r>
-            <a:r>
-              <a:rPr lang="mr-IN" sz="2300" dirty="0"/>
-              <a:t>= </a:t>
-            </a:r>
-            <a:r>
-              <a:rPr lang="mr-IN" sz="2300" dirty="0" smtClean="0"/>
-              <a:t>”</a:t>
-            </a:r>
-            <a:r>
-              <a:rPr lang="en-CA" sz="2300" dirty="0" err="1" smtClean="0"/>
-              <a:t>aaaa-bbbb-cccc-dddd</a:t>
-            </a:r>
-            <a:r>
-              <a:rPr lang="mr-IN" sz="2300" dirty="0" smtClean="0"/>
-              <a:t>"  </a:t>
-            </a:r>
-            <a:r>
-              <a:rPr lang="en-CA" sz="2300" dirty="0" smtClean="0"/>
-              <a:t>	</a:t>
-            </a:r>
-            <a:r>
-              <a:rPr lang="mr-IN" sz="2300" dirty="0" err="1" smtClean="0"/>
-              <a:t>client_secret</a:t>
-            </a:r>
-            <a:r>
-              <a:rPr lang="mr-IN" sz="2300" dirty="0" smtClean="0"/>
-              <a:t>   </a:t>
-            </a:r>
-            <a:r>
-              <a:rPr lang="mr-IN" sz="2300" dirty="0"/>
-              <a:t>= </a:t>
-            </a:r>
-            <a:r>
-              <a:rPr lang="mr-IN" sz="2300" dirty="0" smtClean="0"/>
-              <a:t>”</a:t>
-            </a:r>
-            <a:r>
-              <a:rPr lang="en-CA" sz="2300" dirty="0" err="1" smtClean="0"/>
-              <a:t>aaaa-bbbb-cccc-dddd</a:t>
-            </a:r>
-            <a:r>
-              <a:rPr lang="mr-IN" sz="2300" dirty="0" smtClean="0"/>
-              <a:t>"  </a:t>
-            </a:r>
-            <a:r>
-              <a:rPr lang="en-CA" sz="2300" dirty="0" smtClean="0"/>
-              <a:t>	</a:t>
-            </a:r>
-            <a:r>
-              <a:rPr lang="mr-IN" sz="2300" dirty="0" err="1" smtClean="0"/>
-              <a:t>tenant_id</a:t>
-            </a:r>
-            <a:r>
-              <a:rPr lang="mr-IN" sz="2300" dirty="0" smtClean="0"/>
-              <a:t>       </a:t>
-            </a:r>
-            <a:r>
-              <a:rPr lang="mr-IN" sz="2300" dirty="0"/>
-              <a:t>= </a:t>
-            </a:r>
-            <a:r>
-              <a:rPr lang="mr-IN" sz="2300" dirty="0" smtClean="0"/>
-              <a:t>”</a:t>
-            </a:r>
-            <a:r>
-              <a:rPr lang="en-CA" sz="2300" dirty="0" err="1" smtClean="0"/>
-              <a:t>aaaa-bbbb-cccc-dddd</a:t>
-            </a:r>
-            <a:r>
-              <a:rPr lang="mr-IN" sz="2300" dirty="0" smtClean="0"/>
-              <a:t>”</a:t>
-            </a:r>
-            <a:endParaRPr lang="en-CA" sz="2300" dirty="0" smtClean="0"/>
-          </a:p>
-          <a:p>
-            <a:pPr algn="l">
-              <a:lnSpc>
-                <a:spcPct val="120000"/>
-              </a:lnSpc>
-              <a:defRPr sz="2800">
-                <a:latin typeface="Courier"/>
-                <a:ea typeface="Courier"/>
-                <a:cs typeface="Courier"/>
-                <a:sym typeface="Courier"/>
-              </a:defRPr>
-            </a:pPr>
-            <a:r>
-              <a:rPr lang="mr-IN" sz="2300" dirty="0" smtClean="0"/>
-              <a:t>}</a:t>
-            </a:r>
-            <a:endParaRPr lang="en-US" sz="2300" dirty="0" smtClean="0"/>
-          </a:p>
-          <a:p>
-            <a:pPr algn="l">
-              <a:lnSpc>
-                <a:spcPct val="120000"/>
-              </a:lnSpc>
-              <a:defRPr sz="2800">
-                <a:latin typeface="Courier"/>
-                <a:ea typeface="Courier"/>
-                <a:cs typeface="Courier"/>
-                <a:sym typeface="Courier"/>
-              </a:defRPr>
-            </a:pPr>
-            <a:endParaRPr lang="en-US" sz="2300" dirty="0"/>
-          </a:p>
-          <a:p>
-            <a:pPr algn="l">
-              <a:lnSpc>
-                <a:spcPct val="120000"/>
-              </a:lnSpc>
-              <a:defRPr sz="2800">
-                <a:latin typeface="Courier"/>
-                <a:ea typeface="Courier"/>
-                <a:cs typeface="Courier"/>
-                <a:sym typeface="Courier"/>
-              </a:defRPr>
-            </a:pPr>
-            <a:endParaRPr lang="en-US" sz="2300" dirty="0"/>
-          </a:p>
-          <a:p>
-            <a:pPr algn="l">
-              <a:lnSpc>
-                <a:spcPct val="120000"/>
-              </a:lnSpc>
-              <a:defRPr sz="2800">
-                <a:latin typeface="Courier"/>
-                <a:ea typeface="Courier"/>
-                <a:cs typeface="Courier"/>
-                <a:sym typeface="Courier"/>
-              </a:defRPr>
-            </a:pPr>
-            <a:r>
-              <a:rPr lang="en-US" sz="2300" dirty="0" smtClean="0"/>
-              <a:t>resource "</a:t>
-            </a:r>
-            <a:r>
-              <a:rPr lang="en-US" sz="2300" dirty="0" err="1" smtClean="0"/>
-              <a:t>azurerm_resource_group</a:t>
-            </a:r>
-            <a:r>
-              <a:rPr lang="en-US" sz="2300" dirty="0" smtClean="0"/>
-              <a:t>" “</a:t>
-            </a:r>
-            <a:r>
-              <a:rPr lang="en-US" sz="2300" dirty="0" err="1" smtClean="0"/>
-              <a:t>myfirstrg</a:t>
-            </a:r>
-            <a:r>
-              <a:rPr lang="en-US" sz="2300" dirty="0" smtClean="0"/>
-              <a:t>” {  </a:t>
-            </a:r>
-          </a:p>
-          <a:p>
-            <a:pPr algn="l">
-              <a:lnSpc>
-                <a:spcPct val="120000"/>
-              </a:lnSpc>
-              <a:defRPr sz="2800">
-                <a:latin typeface="Courier"/>
-                <a:ea typeface="Courier"/>
-                <a:cs typeface="Courier"/>
-                <a:sym typeface="Courier"/>
-              </a:defRPr>
-            </a:pPr>
-            <a:r>
-              <a:rPr lang="en-US" sz="2300" dirty="0" smtClean="0"/>
-              <a:t>	````</a:t>
-            </a:r>
-          </a:p>
-          <a:p>
-            <a:pPr algn="l">
-              <a:lnSpc>
-                <a:spcPct val="120000"/>
-              </a:lnSpc>
-              <a:defRPr sz="2800">
-                <a:latin typeface="Courier"/>
-                <a:ea typeface="Courier"/>
-                <a:cs typeface="Courier"/>
-                <a:sym typeface="Courier"/>
-              </a:defRPr>
-            </a:pPr>
-            <a:r>
-              <a:rPr lang="en-US" sz="2300" dirty="0" smtClean="0"/>
-              <a:t>}</a:t>
-            </a:r>
-            <a:endParaRPr sz="2300" dirty="0"/>
-          </a:p>
-        </p:txBody>
-      </p:sp>
-      <p:sp>
-        <p:nvSpPr>
-          <p:cNvPr id="819" name="main.tf"/>
-          <p:cNvSpPr txBox="1">
-            <a:spLocks noGrp="1"/>
-          </p:cNvSpPr>
-          <p:nvPr>
-            <p:ph type="body" idx="14"/>
-          </p:nvPr>
-        </p:nvSpPr>
-        <p:spPr>
-          <a:prstGeom prst="rect">
-            <a:avLst/>
-          </a:prstGeom>
-          <a:extLst>
-            <a:ext uri="{C572A759-6A51-4108-AA02-DFA0A04FC94B}">
-              <ma14:wrappingTextBoxFlag xmlns:ma14="http://schemas.microsoft.com/office/mac/drawingml/2011/main" val="1"/>
-            </a:ext>
-          </a:extLst>
-        </p:spPr>
-        <p:txBody>
-          <a:bodyPr/>
-          <a:lstStyle>
-            <a:lvl1pPr>
-              <a:defRPr sz="2400" b="1">
-                <a:solidFill>
-                  <a:srgbClr val="FFFFFF"/>
-                </a:solidFill>
-                <a:latin typeface="Courier"/>
-                <a:ea typeface="Courier"/>
-                <a:cs typeface="Courier"/>
-                <a:sym typeface="Courier"/>
-              </a:defRPr>
-            </a:lvl1pPr>
-          </a:lstStyle>
-          <a:p>
-            <a:r>
-              <a:t>main.tf</a:t>
-            </a:r>
-          </a:p>
-        </p:txBody>
-      </p:sp>
-    </p:spTree>
-    <p:extLst>
-      <p:ext uri="{BB962C8B-B14F-4D97-AF65-F5344CB8AC3E}">
-        <p14:creationId xmlns:p14="http://schemas.microsoft.com/office/powerpoint/2010/main" val="528742967"/>
-      </p:ext>
-    </p:extLst>
-  </p:cSld>
-  <p:clrMapOvr>
-    <a:masterClrMapping/>
-  </p:clrMapOvr>
-  <p:transition spd="med"/>
-</p:sld>
-</file>
-
-<file path=ppt/slides/slide63.xml><?xml version="1.0" encoding="utf-8"?>
-<p:sld xmlns:a="http://schemas.openxmlformats.org/drawingml/2006/main" xmlns:r="http://schemas.openxmlformats.org/officeDocument/2006/relationships" xmlns:p="http://schemas.openxmlformats.org/presentationml/2006/main">
-  <p:cSld>
-    <p:spTree>
-      <p:nvGrpSpPr>
-        <p:cNvPr id="1" name=""/>
-        <p:cNvGrpSpPr/>
-        <p:nvPr/>
-      </p:nvGrpSpPr>
-      <p:grpSpPr>
-        <a:xfrm>
-          <a:off x="0" y="0"/>
-          <a:ext cx="0" cy="0"/>
-          <a:chOff x="0" y="0"/>
-          <a:chExt cx="0" cy="0"/>
-        </a:xfrm>
-      </p:grpSpPr>
-      <p:sp>
-        <p:nvSpPr>
-          <p:cNvPr id="1066" name="$ terraform apply…"/>
-          <p:cNvSpPr txBox="1">
-            <a:spLocks noGrp="1"/>
-          </p:cNvSpPr>
-          <p:nvPr>
-            <p:ph type="body" idx="13"/>
-          </p:nvPr>
-        </p:nvSpPr>
-        <p:spPr>
-          <a:xfrm>
-            <a:off x="3128486" y="1293828"/>
-            <a:ext cx="8335328" cy="3722045"/>
-          </a:xfrm>
-          <a:prstGeom prst="rect">
-            <a:avLst/>
-          </a:prstGeom>
-          <a:extLst>
-            <a:ext uri="{C572A759-6A51-4108-AA02-DFA0A04FC94B}">
-              <ma14:wrappingTextBoxFlag xmlns:ma14="http://schemas.microsoft.com/office/mac/drawingml/2011/main" val="1"/>
-            </a:ext>
-          </a:extLst>
-        </p:spPr>
-        <p:txBody>
-          <a:bodyPr/>
-          <a:lstStyle/>
-          <a:p>
-            <a:pPr algn="l">
-              <a:lnSpc>
-                <a:spcPct val="120000"/>
-              </a:lnSpc>
-              <a:defRPr sz="2800">
-                <a:solidFill>
-                  <a:srgbClr val="FFFFFF"/>
-                </a:solidFill>
-                <a:latin typeface="Courier"/>
-                <a:ea typeface="Courier"/>
-                <a:cs typeface="Courier"/>
-                <a:sym typeface="Courier"/>
-              </a:defRPr>
-            </a:pPr>
-            <a:r>
-              <a:rPr sz="1400" dirty="0"/>
-              <a:t>$ terraform </a:t>
-            </a:r>
-            <a:r>
-              <a:rPr sz="1400" dirty="0" smtClean="0"/>
-              <a:t>apply</a:t>
-            </a:r>
-            <a:endParaRPr lang="en-CA" sz="1400" dirty="0" smtClean="0"/>
-          </a:p>
-          <a:p>
-            <a:pPr algn="l">
-              <a:lnSpc>
-                <a:spcPct val="120000"/>
-              </a:lnSpc>
-              <a:defRPr sz="2800">
-                <a:solidFill>
-                  <a:srgbClr val="FFFFFF"/>
-                </a:solidFill>
-                <a:latin typeface="Courier"/>
-                <a:ea typeface="Courier"/>
-                <a:cs typeface="Courier"/>
-                <a:sym typeface="Courier"/>
-              </a:defRPr>
-            </a:pPr>
-            <a:endParaRPr sz="1400" dirty="0"/>
-          </a:p>
-          <a:p>
-            <a:pPr algn="l">
-              <a:lnSpc>
-                <a:spcPct val="120000"/>
-              </a:lnSpc>
-              <a:defRPr sz="2800">
-                <a:solidFill>
-                  <a:srgbClr val="FFFFFF"/>
-                </a:solidFill>
-                <a:latin typeface="Courier"/>
-                <a:ea typeface="Courier"/>
-                <a:cs typeface="Courier"/>
-                <a:sym typeface="Courier"/>
-              </a:defRPr>
-            </a:pPr>
-            <a:r>
-              <a:rPr lang="en-US" sz="1400" dirty="0" err="1">
-                <a:solidFill>
-                  <a:srgbClr val="FFFF00"/>
-                </a:solidFill>
-              </a:rPr>
-              <a:t>azurerm_resource_group.myfirstrg</a:t>
-            </a:r>
-            <a:r>
-              <a:rPr lang="en-US" sz="1400" dirty="0">
-                <a:solidFill>
-                  <a:srgbClr val="FFFF00"/>
-                </a:solidFill>
-              </a:rPr>
-              <a:t>: Destroying... (ID: /</a:t>
-            </a:r>
-            <a:r>
-              <a:rPr lang="en-US" sz="1400" dirty="0" smtClean="0">
-                <a:solidFill>
-                  <a:srgbClr val="FFFF00"/>
-                </a:solidFill>
-              </a:rPr>
-              <a:t>subscription/</a:t>
-            </a:r>
-            <a:r>
-              <a:rPr lang="en-US" sz="1400" dirty="0" err="1" smtClean="0">
-                <a:solidFill>
-                  <a:srgbClr val="FFFF00"/>
-                </a:solidFill>
-              </a:rPr>
-              <a:t>resourceGroups</a:t>
-            </a:r>
-            <a:r>
-              <a:rPr lang="en-US" sz="1400" dirty="0" smtClean="0">
-                <a:solidFill>
-                  <a:srgbClr val="FFFF00"/>
-                </a:solidFill>
-              </a:rPr>
-              <a:t>/</a:t>
-            </a:r>
-            <a:r>
-              <a:rPr lang="en-US" sz="1400" dirty="0" err="1" smtClean="0">
-                <a:solidFill>
-                  <a:srgbClr val="FFFF00"/>
-                </a:solidFill>
-              </a:rPr>
-              <a:t>MyFirstResourceGroup</a:t>
-            </a:r>
-            <a:r>
-              <a:rPr lang="en-US" sz="1400" dirty="0">
-                <a:solidFill>
-                  <a:srgbClr val="FFFF00"/>
-                </a:solidFill>
-              </a:rPr>
-              <a:t>)</a:t>
-            </a:r>
-            <a:r>
-              <a:rPr lang="en-US" sz="1400" dirty="0"/>
-              <a:t>	</a:t>
-            </a:r>
-            <a:endParaRPr lang="en-US" sz="1400" dirty="0" smtClean="0"/>
-          </a:p>
-          <a:p>
-            <a:pPr algn="l">
-              <a:lnSpc>
-                <a:spcPct val="120000"/>
-              </a:lnSpc>
-              <a:defRPr sz="2800">
-                <a:solidFill>
-                  <a:srgbClr val="FFFFFF"/>
-                </a:solidFill>
-                <a:latin typeface="Courier"/>
-                <a:ea typeface="Courier"/>
-                <a:cs typeface="Courier"/>
-                <a:sym typeface="Courier"/>
-              </a:defRPr>
-            </a:pPr>
-            <a:r>
-              <a:rPr lang="en-CA" sz="1400" dirty="0" smtClean="0"/>
-              <a:t>	</a:t>
-            </a:r>
-            <a:r>
-              <a:rPr lang="mr-IN" sz="1400" dirty="0" err="1" smtClean="0"/>
-              <a:t>location</a:t>
-            </a:r>
-            <a:r>
-              <a:rPr lang="mr-IN" sz="1400" dirty="0"/>
-              <a:t>:         "" =&gt; "</a:t>
-            </a:r>
-            <a:r>
-              <a:rPr lang="mr-IN" sz="1400" dirty="0" err="1"/>
-              <a:t>eastus</a:t>
-            </a:r>
-            <a:r>
-              <a:rPr lang="mr-IN" sz="1400" dirty="0"/>
-              <a:t>"  </a:t>
-            </a:r>
-            <a:endParaRPr lang="en-CA" sz="1400" dirty="0" smtClean="0"/>
-          </a:p>
-          <a:p>
-            <a:pPr algn="l">
-              <a:lnSpc>
-                <a:spcPct val="120000"/>
-              </a:lnSpc>
-              <a:defRPr sz="2800">
-                <a:solidFill>
-                  <a:srgbClr val="FFFFFF"/>
-                </a:solidFill>
-                <a:latin typeface="Courier"/>
-                <a:ea typeface="Courier"/>
-                <a:cs typeface="Courier"/>
-                <a:sym typeface="Courier"/>
-              </a:defRPr>
-            </a:pPr>
-            <a:r>
-              <a:rPr lang="en-CA" sz="1400" dirty="0"/>
-              <a:t>	</a:t>
-            </a:r>
-            <a:r>
-              <a:rPr lang="mr-IN" sz="1400" dirty="0" err="1" smtClean="0"/>
-              <a:t>name</a:t>
-            </a:r>
-            <a:r>
-              <a:rPr lang="mr-IN" sz="1400" dirty="0"/>
-              <a:t>:             "" =&gt; "</a:t>
-            </a:r>
-            <a:r>
-              <a:rPr lang="mr-IN" sz="1400" dirty="0" err="1"/>
-              <a:t>myfirstresourcegroup</a:t>
-            </a:r>
-            <a:r>
-              <a:rPr lang="mr-IN" sz="1400" dirty="0"/>
-              <a:t>"  </a:t>
-            </a:r>
-            <a:endParaRPr lang="en-CA" sz="1400" dirty="0" smtClean="0"/>
-          </a:p>
-          <a:p>
-            <a:pPr algn="l">
-              <a:lnSpc>
-                <a:spcPct val="120000"/>
-              </a:lnSpc>
-              <a:defRPr sz="2800">
-                <a:solidFill>
-                  <a:srgbClr val="FFFFFF"/>
-                </a:solidFill>
-                <a:latin typeface="Courier"/>
-                <a:ea typeface="Courier"/>
-                <a:cs typeface="Courier"/>
-                <a:sym typeface="Courier"/>
-              </a:defRPr>
-            </a:pPr>
-            <a:r>
-              <a:rPr lang="en-CA" sz="1400" dirty="0"/>
-              <a:t>	</a:t>
-            </a:r>
-            <a:r>
-              <a:rPr lang="mr-IN" sz="1400" dirty="0" err="1" smtClean="0"/>
-              <a:t>tags</a:t>
-            </a:r>
-            <a:r>
-              <a:rPr lang="mr-IN" sz="1400" dirty="0"/>
-              <a:t>.%:           "" =&gt; "1"  </a:t>
-            </a:r>
-            <a:endParaRPr lang="en-CA" sz="1400" dirty="0" smtClean="0"/>
-          </a:p>
-          <a:p>
-            <a:pPr algn="l">
-              <a:lnSpc>
-                <a:spcPct val="120000"/>
-              </a:lnSpc>
-              <a:defRPr sz="2800">
-                <a:solidFill>
-                  <a:srgbClr val="FFFFFF"/>
-                </a:solidFill>
-                <a:latin typeface="Courier"/>
-                <a:ea typeface="Courier"/>
-                <a:cs typeface="Courier"/>
-                <a:sym typeface="Courier"/>
-              </a:defRPr>
-            </a:pPr>
-            <a:r>
-              <a:rPr lang="en-CA" sz="1400" dirty="0"/>
-              <a:t>	</a:t>
-            </a:r>
-            <a:r>
-              <a:rPr lang="mr-IN" sz="1400" dirty="0" err="1" smtClean="0"/>
-              <a:t>tags.environment</a:t>
-            </a:r>
-            <a:r>
-              <a:rPr lang="mr-IN" sz="1400" dirty="0"/>
-              <a:t>: "" =&gt; "</a:t>
-            </a:r>
-            <a:r>
-              <a:rPr lang="mr-IN" sz="1400" dirty="0" err="1"/>
-              <a:t>Production</a:t>
-            </a:r>
-            <a:r>
-              <a:rPr lang="mr-IN" sz="1400" dirty="0"/>
-              <a:t>"</a:t>
-            </a:r>
-            <a:endParaRPr lang="en-US" sz="1400" dirty="0" smtClean="0"/>
-          </a:p>
-          <a:p>
-            <a:pPr algn="l">
-              <a:lnSpc>
-                <a:spcPct val="120000"/>
-              </a:lnSpc>
-              <a:defRPr sz="2800">
-                <a:solidFill>
-                  <a:srgbClr val="FFFFFF"/>
-                </a:solidFill>
-                <a:latin typeface="Courier"/>
-                <a:ea typeface="Courier"/>
-                <a:cs typeface="Courier"/>
-                <a:sym typeface="Courier"/>
-              </a:defRPr>
-            </a:pPr>
-            <a:endParaRPr lang="en-US" sz="1400" dirty="0" smtClean="0">
-              <a:solidFill>
-                <a:srgbClr val="FFFF00"/>
-              </a:solidFill>
-            </a:endParaRPr>
-          </a:p>
-          <a:p>
-            <a:pPr algn="l">
-              <a:lnSpc>
-                <a:spcPct val="120000"/>
-              </a:lnSpc>
-              <a:defRPr sz="2800">
-                <a:solidFill>
-                  <a:srgbClr val="FFFFFF"/>
-                </a:solidFill>
-                <a:latin typeface="Courier"/>
-                <a:ea typeface="Courier"/>
-                <a:cs typeface="Courier"/>
-                <a:sym typeface="Courier"/>
-              </a:defRPr>
-            </a:pPr>
-            <a:endParaRPr lang="en-US" sz="1400" dirty="0">
-              <a:solidFill>
-                <a:srgbClr val="FFFF00"/>
-              </a:solidFill>
-            </a:endParaRPr>
-          </a:p>
-          <a:p>
-            <a:pPr algn="l">
-              <a:lnSpc>
-                <a:spcPct val="120000"/>
-              </a:lnSpc>
-              <a:defRPr sz="2800">
-                <a:solidFill>
-                  <a:srgbClr val="FFFFFF"/>
-                </a:solidFill>
-                <a:latin typeface="Courier"/>
-                <a:ea typeface="Courier"/>
-                <a:cs typeface="Courier"/>
-                <a:sym typeface="Courier"/>
-              </a:defRPr>
-            </a:pPr>
-            <a:r>
-              <a:rPr lang="en-US" sz="1400" dirty="0" err="1">
-                <a:solidFill>
-                  <a:srgbClr val="FFFF00"/>
-                </a:solidFill>
-              </a:rPr>
-              <a:t>azurerm_resource_group.myfirstrg</a:t>
-            </a:r>
-            <a:r>
-              <a:rPr lang="en-US" sz="1400" dirty="0">
-                <a:solidFill>
-                  <a:srgbClr val="FFFF00"/>
-                </a:solidFill>
-              </a:rPr>
-              <a:t>: Creation complete after 1s (ID: /</a:t>
-            </a:r>
-            <a:r>
-              <a:rPr lang="en-US" sz="1400" dirty="0" smtClean="0">
-                <a:solidFill>
-                  <a:srgbClr val="FFFF00"/>
-                </a:solidFill>
-              </a:rPr>
-              <a:t>subscriptions/</a:t>
-            </a:r>
-            <a:r>
-              <a:rPr lang="en-US" sz="1400" dirty="0" err="1" smtClean="0">
-                <a:solidFill>
-                  <a:srgbClr val="FFFF00"/>
-                </a:solidFill>
-              </a:rPr>
-              <a:t>resourceGroups</a:t>
-            </a:r>
-            <a:r>
-              <a:rPr lang="en-US" sz="1400" dirty="0" smtClean="0">
-                <a:solidFill>
-                  <a:srgbClr val="FFFF00"/>
-                </a:solidFill>
-              </a:rPr>
-              <a:t>/</a:t>
-            </a:r>
-            <a:r>
-              <a:rPr lang="en-US" sz="1400" dirty="0" err="1" smtClean="0">
-                <a:solidFill>
-                  <a:srgbClr val="FFFF00"/>
-                </a:solidFill>
-              </a:rPr>
-              <a:t>myfirstresourcegroup</a:t>
-            </a:r>
-            <a:r>
-              <a:rPr lang="en-US" sz="1400" dirty="0" smtClean="0">
-                <a:solidFill>
-                  <a:srgbClr val="FFFF00"/>
-                </a:solidFill>
-              </a:rPr>
-              <a:t>)</a:t>
-            </a:r>
-          </a:p>
-          <a:p>
-            <a:pPr algn="l">
-              <a:lnSpc>
-                <a:spcPct val="120000"/>
-              </a:lnSpc>
-              <a:defRPr sz="2800">
-                <a:solidFill>
-                  <a:srgbClr val="FFFFFF"/>
-                </a:solidFill>
-                <a:latin typeface="Courier"/>
-                <a:ea typeface="Courier"/>
-                <a:cs typeface="Courier"/>
-                <a:sym typeface="Courier"/>
-              </a:defRPr>
-            </a:pPr>
-            <a:endParaRPr lang="en-US" sz="1400" dirty="0"/>
-          </a:p>
-          <a:p>
-            <a:pPr algn="l">
-              <a:lnSpc>
-                <a:spcPct val="120000"/>
-              </a:lnSpc>
-              <a:defRPr sz="2800">
-                <a:solidFill>
-                  <a:srgbClr val="FFFFFF"/>
-                </a:solidFill>
-                <a:latin typeface="Courier"/>
-                <a:ea typeface="Courier"/>
-                <a:cs typeface="Courier"/>
-                <a:sym typeface="Courier"/>
-              </a:defRPr>
-            </a:pPr>
-            <a:r>
-              <a:rPr lang="en-US" sz="1400" dirty="0" smtClean="0">
-                <a:solidFill>
-                  <a:schemeClr val="accent2">
-                    <a:lumMod val="60000"/>
-                    <a:lumOff val="40000"/>
-                  </a:schemeClr>
-                </a:solidFill>
-              </a:rPr>
-              <a:t>Apply </a:t>
-            </a:r>
-            <a:r>
-              <a:rPr lang="en-US" sz="1400" dirty="0">
-                <a:solidFill>
-                  <a:schemeClr val="accent2">
-                    <a:lumMod val="60000"/>
-                    <a:lumOff val="40000"/>
-                  </a:schemeClr>
-                </a:solidFill>
-              </a:rPr>
-              <a:t>complete! Resources: 1 added, 0 changed, </a:t>
-            </a:r>
-            <a:r>
-              <a:rPr lang="en-US" sz="1400" dirty="0" smtClean="0">
-                <a:solidFill>
-                  <a:schemeClr val="accent2">
-                    <a:lumMod val="60000"/>
-                    <a:lumOff val="40000"/>
-                  </a:schemeClr>
-                </a:solidFill>
-              </a:rPr>
-              <a:t>1 </a:t>
-            </a:r>
-            <a:r>
-              <a:rPr lang="en-US" sz="1400" dirty="0">
-                <a:solidFill>
-                  <a:schemeClr val="accent2">
-                    <a:lumMod val="60000"/>
-                    <a:lumOff val="40000"/>
-                  </a:schemeClr>
-                </a:solidFill>
-              </a:rPr>
-              <a:t>destroyed.</a:t>
-            </a:r>
-            <a:endParaRPr sz="1400" dirty="0">
-              <a:solidFill>
-                <a:schemeClr val="accent2">
-                  <a:lumMod val="60000"/>
-                  <a:lumOff val="40000"/>
-                </a:schemeClr>
-              </a:solidFill>
-            </a:endParaRPr>
-          </a:p>
-        </p:txBody>
-      </p:sp>
-    </p:spTree>
-    <p:extLst>
-      <p:ext uri="{BB962C8B-B14F-4D97-AF65-F5344CB8AC3E}">
-        <p14:creationId xmlns:p14="http://schemas.microsoft.com/office/powerpoint/2010/main" val="639871201"/>
-      </p:ext>
-    </p:extLst>
-  </p:cSld>
-  <p:clrMapOvr>
-    <a:masterClrMapping/>
-  </p:clrMapOvr>
-  <p:transition spd="med"/>
-</p:sld>
-</file>
-
-<file path=ppt/slides/slide64.xml><?xml version="1.0" encoding="utf-8"?>
-<p:sld xmlns:a="http://schemas.openxmlformats.org/drawingml/2006/main" xmlns:r="http://schemas.openxmlformats.org/officeDocument/2006/relationships" xmlns:p="http://schemas.openxmlformats.org/presentationml/2006/main">
-  <p:cSld>
-    <p:spTree>
-      <p:nvGrpSpPr>
-        <p:cNvPr id="1" name=""/>
-        <p:cNvGrpSpPr/>
-        <p:nvPr/>
-      </p:nvGrpSpPr>
-      <p:grpSpPr>
-        <a:xfrm>
-          <a:off x="0" y="0"/>
-          <a:ext cx="0" cy="0"/>
-          <a:chOff x="0" y="0"/>
-          <a:chExt cx="0" cy="0"/>
-        </a:xfrm>
-      </p:grpSpPr>
-      <p:sp>
-        <p:nvSpPr>
-          <p:cNvPr id="298" name="Glossary"/>
-          <p:cNvSpPr txBox="1">
-            <a:spLocks noGrp="1"/>
-          </p:cNvSpPr>
-          <p:nvPr>
-            <p:ph type="title"/>
-          </p:nvPr>
-        </p:nvSpPr>
-        <p:spPr>
-          <a:prstGeom prst="rect">
-            <a:avLst/>
-          </a:prstGeom>
-        </p:spPr>
-        <p:txBody>
-          <a:bodyPr/>
-          <a:lstStyle/>
-          <a:p>
-            <a:r>
-              <a:t>Glossary</a:t>
-            </a:r>
-          </a:p>
-        </p:txBody>
-      </p:sp>
-      <p:sp>
-        <p:nvSpPr>
-          <p:cNvPr id="299" name="(Resource) Attribute…"/>
-          <p:cNvSpPr txBox="1">
-            <a:spLocks noGrp="1"/>
-          </p:cNvSpPr>
-          <p:nvPr>
-            <p:ph type="body" idx="1"/>
-          </p:nvPr>
-        </p:nvSpPr>
-        <p:spPr>
-          <a:prstGeom prst="rect">
-            <a:avLst/>
-          </a:prstGeom>
-        </p:spPr>
-        <p:txBody>
-          <a:bodyPr/>
-          <a:lstStyle/>
-          <a:p>
-            <a:pPr>
-              <a:defRPr b="1">
-                <a:latin typeface="Klavika Basic"/>
-                <a:ea typeface="Klavika Basic"/>
-                <a:cs typeface="Klavika Basic"/>
-                <a:sym typeface="Klavika Basic"/>
-              </a:defRPr>
-            </a:pPr>
-            <a:r>
-              <a:t>(Resource) Attribute</a:t>
-            </a:r>
-          </a:p>
-          <a:p>
-            <a:r>
-              <a:t>An attribute is an output or computed value available only after resource creation. An AWS EC2 instance provides </a:t>
-            </a:r>
-            <a:r>
-              <a:rPr>
-                <a:latin typeface="Courier"/>
-                <a:ea typeface="Courier"/>
-                <a:cs typeface="Courier"/>
-                <a:sym typeface="Courier"/>
-              </a:rPr>
-              <a:t>public_ip</a:t>
-            </a:r>
-            <a:r>
-              <a:t> as an output parameter. This makes </a:t>
-            </a:r>
-            <a:r>
-              <a:rPr>
-                <a:latin typeface="Courier"/>
-                <a:ea typeface="Courier"/>
-                <a:cs typeface="Courier"/>
-                <a:sym typeface="Courier"/>
-              </a:rPr>
-              <a:t>public_ip</a:t>
-            </a:r>
-            <a:r>
-              <a:t> an attribute to the </a:t>
-            </a:r>
-            <a:r>
-              <a:rPr>
-                <a:latin typeface="Courier"/>
-                <a:ea typeface="Courier"/>
-                <a:cs typeface="Courier"/>
-                <a:sym typeface="Courier"/>
-              </a:rPr>
-              <a:t>aws_instance</a:t>
-            </a:r>
-            <a:r>
-              <a:t> resource. This makes sense, because an instance's IP address is assigned during creation.</a:t>
-            </a:r>
-          </a:p>
-        </p:txBody>
-      </p:sp>
-    </p:spTree>
-    <p:extLst>
-      <p:ext uri="{BB962C8B-B14F-4D97-AF65-F5344CB8AC3E}">
-        <p14:creationId xmlns:p14="http://schemas.microsoft.com/office/powerpoint/2010/main" val="1585128078"/>
-      </p:ext>
-    </p:extLst>
-  </p:cSld>
-  <p:clrMapOvr>
-    <a:masterClrMapping/>
-  </p:clrMapOvr>
-  <p:transition spd="med"/>
-</p:sld>
-</file>
-
-<file path=ppt/slides/slide65.xml><?xml version="1.0" encoding="utf-8"?>
-<p:sld xmlns:a="http://schemas.openxmlformats.org/drawingml/2006/main" xmlns:r="http://schemas.openxmlformats.org/officeDocument/2006/relationships" xmlns:p="http://schemas.openxmlformats.org/presentationml/2006/main">
-  <p:cSld>
-    <p:spTree>
-      <p:nvGrpSpPr>
-        <p:cNvPr id="1" name=""/>
-        <p:cNvGrpSpPr/>
-        <p:nvPr/>
-      </p:nvGrpSpPr>
-      <p:grpSpPr>
-        <a:xfrm>
-          <a:off x="0" y="0"/>
-          <a:ext cx="0" cy="0"/>
-          <a:chOff x="0" y="0"/>
-          <a:chExt cx="0" cy="0"/>
-        </a:xfrm>
-      </p:grpSpPr>
-      <p:sp>
-        <p:nvSpPr>
-          <p:cNvPr id="882" name="resource &quot;aws_instance&quot; &quot;web&quot; {…"/>
-          <p:cNvSpPr txBox="1">
-            <a:spLocks noGrp="1"/>
-          </p:cNvSpPr>
-          <p:nvPr>
-            <p:ph type="body" idx="13"/>
-          </p:nvPr>
-        </p:nvSpPr>
-        <p:spPr>
-          <a:xfrm>
-            <a:off x="3128486" y="1293828"/>
-            <a:ext cx="8335328" cy="1801519"/>
-          </a:xfrm>
-          <a:prstGeom prst="rect">
-            <a:avLst/>
-          </a:prstGeom>
-          <a:extLst>
-            <a:ext uri="{C572A759-6A51-4108-AA02-DFA0A04FC94B}">
-              <ma14:wrappingTextBoxFlag xmlns:ma14="http://schemas.microsoft.com/office/mac/drawingml/2011/main" val="1"/>
-            </a:ext>
-          </a:extLst>
-        </p:spPr>
-        <p:txBody>
-          <a:bodyPr/>
-          <a:lstStyle/>
-          <a:p>
-            <a:pPr algn="l">
-              <a:lnSpc>
-                <a:spcPct val="120000"/>
-              </a:lnSpc>
-              <a:defRPr sz="2800">
-                <a:latin typeface="Courier"/>
-                <a:ea typeface="Courier"/>
-                <a:cs typeface="Courier"/>
-                <a:sym typeface="Courier"/>
-              </a:defRPr>
-            </a:pPr>
-            <a:r>
-              <a:rPr sz="2300" dirty="0"/>
-              <a:t>resource </a:t>
-            </a:r>
-            <a:r>
-              <a:rPr sz="2300" dirty="0" smtClean="0"/>
-              <a:t>"</a:t>
-            </a:r>
-            <a:r>
-              <a:rPr lang="en-CA" sz="2300" dirty="0" err="1" smtClean="0"/>
-              <a:t>azurerm_resource_group</a:t>
-            </a:r>
-            <a:r>
-              <a:rPr sz="2300" dirty="0" smtClean="0"/>
-              <a:t>" "</a:t>
-            </a:r>
-            <a:r>
-              <a:rPr lang="en-CA" sz="2300" dirty="0" err="1" smtClean="0"/>
-              <a:t>myfirstrg</a:t>
-            </a:r>
-            <a:r>
-              <a:rPr sz="2300" dirty="0" smtClean="0"/>
-              <a:t>" </a:t>
-            </a:r>
-            <a:r>
-              <a:rPr sz="2300" dirty="0"/>
-              <a:t>{</a:t>
-            </a:r>
-          </a:p>
-          <a:p>
-            <a:pPr algn="l">
-              <a:lnSpc>
-                <a:spcPct val="120000"/>
-              </a:lnSpc>
-              <a:defRPr sz="2800">
-                <a:latin typeface="Courier"/>
-                <a:ea typeface="Courier"/>
-                <a:cs typeface="Courier"/>
-                <a:sym typeface="Courier"/>
-              </a:defRPr>
-            </a:pPr>
-            <a:r>
-              <a:rPr sz="2300" dirty="0"/>
-              <a:t>  </a:t>
-            </a:r>
-            <a:r>
-              <a:rPr lang="en-CA" sz="2300" dirty="0" smtClean="0"/>
-              <a:t>name</a:t>
-            </a:r>
-            <a:r>
-              <a:rPr sz="2300" dirty="0" smtClean="0"/>
-              <a:t>           </a:t>
-            </a:r>
-            <a:r>
-              <a:rPr sz="2300" dirty="0"/>
-              <a:t>= </a:t>
-            </a:r>
-            <a:r>
-              <a:rPr sz="2300" dirty="0" smtClean="0"/>
-              <a:t>"</a:t>
-            </a:r>
-            <a:r>
-              <a:rPr lang="en-CA" sz="2300" dirty="0" err="1" smtClean="0"/>
-              <a:t>myfirstresourcegroup</a:t>
-            </a:r>
-            <a:r>
-              <a:rPr sz="2300" dirty="0" smtClean="0"/>
-              <a:t>"</a:t>
-            </a:r>
-            <a:endParaRPr sz="2300" dirty="0"/>
-          </a:p>
-          <a:p>
-            <a:pPr algn="l">
-              <a:lnSpc>
-                <a:spcPct val="120000"/>
-              </a:lnSpc>
-              <a:defRPr sz="2800">
-                <a:latin typeface="Courier"/>
-                <a:ea typeface="Courier"/>
-                <a:cs typeface="Courier"/>
-                <a:sym typeface="Courier"/>
-              </a:defRPr>
-            </a:pPr>
-            <a:r>
-              <a:rPr sz="2300" dirty="0"/>
-              <a:t>  </a:t>
-            </a:r>
-            <a:r>
-              <a:rPr lang="en-CA" sz="2300" dirty="0" smtClean="0"/>
-              <a:t>location		  </a:t>
-            </a:r>
-            <a:r>
-              <a:rPr sz="2300" dirty="0" smtClean="0"/>
-              <a:t> </a:t>
-            </a:r>
-            <a:r>
-              <a:rPr sz="2300" dirty="0"/>
-              <a:t>= </a:t>
-            </a:r>
-            <a:r>
-              <a:rPr sz="2300" dirty="0" smtClean="0"/>
-              <a:t>"</a:t>
-            </a:r>
-            <a:r>
-              <a:rPr lang="en-CA" sz="2300" dirty="0" smtClean="0"/>
-              <a:t>East US</a:t>
-            </a:r>
-            <a:r>
-              <a:rPr sz="2300" dirty="0" smtClean="0"/>
-              <a:t>"</a:t>
-            </a:r>
-            <a:endParaRPr sz="2300" dirty="0"/>
-          </a:p>
-          <a:p>
-            <a:pPr algn="l">
-              <a:lnSpc>
-                <a:spcPct val="120000"/>
-              </a:lnSpc>
-              <a:defRPr sz="2800">
-                <a:latin typeface="Courier"/>
-                <a:ea typeface="Courier"/>
-                <a:cs typeface="Courier"/>
-                <a:sym typeface="Courier"/>
-              </a:defRPr>
-            </a:pPr>
-            <a:r>
-              <a:rPr sz="2300" dirty="0"/>
-              <a:t>}</a:t>
-            </a:r>
-          </a:p>
-        </p:txBody>
-      </p:sp>
-      <p:sp>
-        <p:nvSpPr>
-          <p:cNvPr id="883" name="main.tf"/>
-          <p:cNvSpPr txBox="1">
-            <a:spLocks noGrp="1"/>
-          </p:cNvSpPr>
-          <p:nvPr>
-            <p:ph type="body" idx="14"/>
-          </p:nvPr>
-        </p:nvSpPr>
-        <p:spPr>
-          <a:prstGeom prst="rect">
-            <a:avLst/>
-          </a:prstGeom>
-          <a:extLst>
-            <a:ext uri="{C572A759-6A51-4108-AA02-DFA0A04FC94B}">
-              <ma14:wrappingTextBoxFlag xmlns:ma14="http://schemas.microsoft.com/office/mac/drawingml/2011/main" val="1"/>
-            </a:ext>
-          </a:extLst>
-        </p:spPr>
-        <p:txBody>
-          <a:bodyPr/>
-          <a:lstStyle>
-            <a:lvl1pPr>
-              <a:defRPr sz="2400" b="1">
-                <a:solidFill>
-                  <a:srgbClr val="FFFFFF"/>
-                </a:solidFill>
-                <a:latin typeface="Courier"/>
-                <a:ea typeface="Courier"/>
-                <a:cs typeface="Courier"/>
-                <a:sym typeface="Courier"/>
-              </a:defRPr>
-            </a:lvl1pPr>
-          </a:lstStyle>
-          <a:p>
-            <a:r>
-              <a:t>main.tf</a:t>
-            </a:r>
-          </a:p>
-        </p:txBody>
-      </p:sp>
-    </p:spTree>
-    <p:extLst>
-      <p:ext uri="{BB962C8B-B14F-4D97-AF65-F5344CB8AC3E}">
-        <p14:creationId xmlns:p14="http://schemas.microsoft.com/office/powerpoint/2010/main" val="2036041781"/>
-      </p:ext>
-    </p:extLst>
-  </p:cSld>
-  <p:clrMapOvr>
-    <a:masterClrMapping/>
-  </p:clrMapOvr>
-  <p:transition spd="med"/>
-</p:sld>
-</file>
-
-<file path=ppt/slides/slide66.xml><?xml version="1.0" encoding="utf-8"?>
-<p:sld xmlns:a="http://schemas.openxmlformats.org/drawingml/2006/main" xmlns:r="http://schemas.openxmlformats.org/officeDocument/2006/relationships" xmlns:p="http://schemas.openxmlformats.org/presentationml/2006/main">
-  <p:cSld>
-    <p:spTree>
-      <p:nvGrpSpPr>
-        <p:cNvPr id="1" name=""/>
-        <p:cNvGrpSpPr/>
-        <p:nvPr/>
-      </p:nvGrpSpPr>
-      <p:grpSpPr>
-        <a:xfrm>
-          <a:off x="0" y="0"/>
-          <a:ext cx="0" cy="0"/>
-          <a:chOff x="0" y="0"/>
-          <a:chExt cx="0" cy="0"/>
-        </a:xfrm>
-      </p:grpSpPr>
-      <p:sp>
-        <p:nvSpPr>
-          <p:cNvPr id="313" name="Glossary"/>
-          <p:cNvSpPr txBox="1">
-            <a:spLocks noGrp="1"/>
-          </p:cNvSpPr>
-          <p:nvPr>
-            <p:ph type="title"/>
-          </p:nvPr>
-        </p:nvSpPr>
-        <p:spPr>
-          <a:prstGeom prst="rect">
-            <a:avLst/>
-          </a:prstGeom>
-        </p:spPr>
-        <p:txBody>
-          <a:bodyPr/>
-          <a:lstStyle/>
-          <a:p>
-            <a:r>
-              <a:t>Glossary</a:t>
-            </a:r>
-          </a:p>
-        </p:txBody>
-      </p:sp>
-      <p:sp>
-        <p:nvSpPr>
-          <p:cNvPr id="314" name="Output…"/>
-          <p:cNvSpPr txBox="1">
-            <a:spLocks noGrp="1"/>
-          </p:cNvSpPr>
-          <p:nvPr>
-            <p:ph type="body" idx="1"/>
-          </p:nvPr>
-        </p:nvSpPr>
-        <p:spPr>
-          <a:prstGeom prst="rect">
-            <a:avLst/>
-          </a:prstGeom>
-        </p:spPr>
-        <p:txBody>
-          <a:bodyPr/>
-          <a:lstStyle/>
-          <a:p>
-            <a:pPr>
-              <a:defRPr b="1">
-                <a:latin typeface="Klavika Basic"/>
-                <a:ea typeface="Klavika Basic"/>
-                <a:cs typeface="Klavika Basic"/>
-                <a:sym typeface="Klavika Basic"/>
-              </a:defRPr>
-            </a:pPr>
-            <a:r>
-              <a:t>Output</a:t>
-            </a:r>
-          </a:p>
-          <a:p>
-            <a:r>
-              <a:t>An output is a configurable piece of information that is highlighted at the end of a Terraform run.</a:t>
-            </a:r>
-          </a:p>
-        </p:txBody>
-      </p:sp>
-    </p:spTree>
-    <p:extLst>
-      <p:ext uri="{BB962C8B-B14F-4D97-AF65-F5344CB8AC3E}">
-        <p14:creationId xmlns:p14="http://schemas.microsoft.com/office/powerpoint/2010/main" val="532074164"/>
       </p:ext>
     </p:extLst>
   </p:cSld>

</xml_diff>